<commit_message>
Update installation instruction for MATLAB
</commit_message>
<xml_diff>
--- a/src/videos/matlab_installation.pptx
+++ b/src/videos/matlab_installation.pptx
@@ -3259,8 +3259,8 @@
         </p:nvSpPr>
         <p:spPr>
           <a:xfrm>
-            <a:off x="3287487" y="1606549"/>
-            <a:ext cx="5667830" cy="1320801"/>
+            <a:off x="3483430" y="1193800"/>
+            <a:ext cx="5268684" cy="1320801"/>
           </a:xfrm>
           <a:prstGeom prst="rect">
             <a:avLst/>
@@ -3439,69 +3439,52 @@
                 <a:latin typeface="Source Sans Pro Light"/>
                 <a:cs typeface="Source Sans Pro Light"/>
               </a:rPr>
-              <a:t>Using MATLAB with </a:t>
-            </a:r>
-            <a:r>
-              <a:rPr lang="en-US" sz="4400" dirty="0" smtClean="0">
-                <a:solidFill>
-                  <a:schemeClr val="accent1"/>
-                </a:solidFill>
-                <a:latin typeface="Source Sans Pro Light"/>
-                <a:cs typeface="Source Sans Pro Light"/>
-              </a:rPr>
-              <a:t>SoS</a:t>
-            </a:r>
-          </a:p>
-          <a:p>
-            <a:pPr algn="l">
-              <a:spcBef>
-                <a:spcPts val="900"/>
-              </a:spcBef>
-            </a:pPr>
-            <a:r>
-              <a:rPr lang="en-US" sz="1600" dirty="0" smtClean="0">
-                <a:solidFill>
-                  <a:schemeClr val="accent1"/>
-                </a:solidFill>
-                <a:latin typeface="Source Sans Pro Light"/>
-                <a:cs typeface="Source Sans Pro Light"/>
-              </a:rPr>
-              <a:t>Installation of MATLAB kernel, sos-</a:t>
-            </a:r>
-            <a:r>
-              <a:rPr lang="en-US" sz="1600" dirty="0" err="1" smtClean="0">
-                <a:solidFill>
-                  <a:schemeClr val="accent1"/>
-                </a:solidFill>
-                <a:latin typeface="Source Sans Pro Light"/>
-                <a:cs typeface="Source Sans Pro Light"/>
-              </a:rPr>
-              <a:t>matlab</a:t>
-            </a:r>
-            <a:r>
-              <a:rPr lang="en-US" sz="1600" dirty="0" smtClean="0">
-                <a:solidFill>
-                  <a:schemeClr val="accent1"/>
-                </a:solidFill>
-                <a:latin typeface="Source Sans Pro Light"/>
-                <a:cs typeface="Source Sans Pro Light"/>
-              </a:rPr>
-              <a:t> package</a:t>
-            </a:r>
-          </a:p>
-          <a:p>
-            <a:pPr algn="l">
-              <a:spcBef>
-                <a:spcPts val="900"/>
-              </a:spcBef>
-            </a:pPr>
-            <a:endParaRPr lang="en-US" sz="1600" dirty="0" smtClean="0">
+              <a:t>Using MATLAB with SoS Notebook</a:t>
+            </a:r>
+            <a:endParaRPr lang="en-US" sz="4400" dirty="0" smtClean="0">
               <a:solidFill>
                 <a:schemeClr val="accent1"/>
               </a:solidFill>
               <a:latin typeface="Source Sans Pro Light"/>
               <a:cs typeface="Source Sans Pro Light"/>
             </a:endParaRPr>
+          </a:p>
+          <a:p>
+            <a:pPr algn="l">
+              <a:spcBef>
+                <a:spcPts val="900"/>
+              </a:spcBef>
+            </a:pPr>
+            <a:r>
+              <a:rPr lang="en-US" sz="1600" dirty="0" smtClean="0">
+                <a:solidFill>
+                  <a:schemeClr val="accent1"/>
+                </a:solidFill>
+                <a:latin typeface="Source Sans Pro Light"/>
+                <a:cs typeface="Source Sans Pro Light"/>
+              </a:rPr>
+              <a:t>Installation of MATLAB kernel, sos-</a:t>
+            </a:r>
+            <a:r>
+              <a:rPr lang="en-US" sz="1600" dirty="0" err="1" smtClean="0">
+                <a:solidFill>
+                  <a:schemeClr val="accent1"/>
+                </a:solidFill>
+                <a:latin typeface="Source Sans Pro Light"/>
+                <a:cs typeface="Source Sans Pro Light"/>
+              </a:rPr>
+              <a:t>matlab</a:t>
+            </a:r>
+            <a:r>
+              <a:rPr lang="en-US" sz="1600" dirty="0" smtClean="0">
+                <a:solidFill>
+                  <a:schemeClr val="accent1"/>
+                </a:solidFill>
+                <a:latin typeface="Source Sans Pro Light"/>
+                <a:cs typeface="Source Sans Pro Light"/>
+              </a:rPr>
+              <a:t> package, and exchange of variables. </a:t>
+            </a:r>
           </a:p>
           <a:p>
             <a:pPr algn="l">

</xml_diff>

<commit_message>
Upload a video on the installation of MATLAB
</commit_message>
<xml_diff>
--- a/src/videos/matlab_installation.pptx
+++ b/src/videos/matlab_installation.pptx
@@ -304,7 +304,7 @@
           <a:p>
             <a:fld id="{0E7CC0F2-DA42-B046-B261-A309B05013EA}" type="datetimeFigureOut">
               <a:rPr lang="en-US" smtClean="0"/>
-              <a:t>11/14/17</a:t>
+              <a:t>11/16/17</a:t>
             </a:fld>
             <a:endParaRPr lang="en-US"/>
           </a:p>
@@ -474,7 +474,7 @@
           <a:p>
             <a:fld id="{0E7CC0F2-DA42-B046-B261-A309B05013EA}" type="datetimeFigureOut">
               <a:rPr lang="en-US" smtClean="0"/>
-              <a:t>11/14/17</a:t>
+              <a:t>11/16/17</a:t>
             </a:fld>
             <a:endParaRPr lang="en-US"/>
           </a:p>
@@ -654,7 +654,7 @@
           <a:p>
             <a:fld id="{0E7CC0F2-DA42-B046-B261-A309B05013EA}" type="datetimeFigureOut">
               <a:rPr lang="en-US" smtClean="0"/>
-              <a:t>11/14/17</a:t>
+              <a:t>11/16/17</a:t>
             </a:fld>
             <a:endParaRPr lang="en-US"/>
           </a:p>
@@ -824,7 +824,7 @@
           <a:p>
             <a:fld id="{0E7CC0F2-DA42-B046-B261-A309B05013EA}" type="datetimeFigureOut">
               <a:rPr lang="en-US" smtClean="0"/>
-              <a:t>11/14/17</a:t>
+              <a:t>11/16/17</a:t>
             </a:fld>
             <a:endParaRPr lang="en-US"/>
           </a:p>
@@ -1070,7 +1070,7 @@
           <a:p>
             <a:fld id="{0E7CC0F2-DA42-B046-B261-A309B05013EA}" type="datetimeFigureOut">
               <a:rPr lang="en-US" smtClean="0"/>
-              <a:t>11/14/17</a:t>
+              <a:t>11/16/17</a:t>
             </a:fld>
             <a:endParaRPr lang="en-US"/>
           </a:p>
@@ -1358,7 +1358,7 @@
           <a:p>
             <a:fld id="{0E7CC0F2-DA42-B046-B261-A309B05013EA}" type="datetimeFigureOut">
               <a:rPr lang="en-US" smtClean="0"/>
-              <a:t>11/14/17</a:t>
+              <a:t>11/16/17</a:t>
             </a:fld>
             <a:endParaRPr lang="en-US"/>
           </a:p>
@@ -1785,7 +1785,7 @@
           <a:p>
             <a:fld id="{0E7CC0F2-DA42-B046-B261-A309B05013EA}" type="datetimeFigureOut">
               <a:rPr lang="en-US" smtClean="0"/>
-              <a:t>11/14/17</a:t>
+              <a:t>11/16/17</a:t>
             </a:fld>
             <a:endParaRPr lang="en-US"/>
           </a:p>
@@ -1903,7 +1903,7 @@
           <a:p>
             <a:fld id="{0E7CC0F2-DA42-B046-B261-A309B05013EA}" type="datetimeFigureOut">
               <a:rPr lang="en-US" smtClean="0"/>
-              <a:t>11/14/17</a:t>
+              <a:t>11/16/17</a:t>
             </a:fld>
             <a:endParaRPr lang="en-US"/>
           </a:p>
@@ -1998,7 +1998,7 @@
           <a:p>
             <a:fld id="{0E7CC0F2-DA42-B046-B261-A309B05013EA}" type="datetimeFigureOut">
               <a:rPr lang="en-US" smtClean="0"/>
-              <a:t>11/14/17</a:t>
+              <a:t>11/16/17</a:t>
             </a:fld>
             <a:endParaRPr lang="en-US"/>
           </a:p>
@@ -2275,7 +2275,7 @@
           <a:p>
             <a:fld id="{0E7CC0F2-DA42-B046-B261-A309B05013EA}" type="datetimeFigureOut">
               <a:rPr lang="en-US" smtClean="0"/>
-              <a:t>11/14/17</a:t>
+              <a:t>11/16/17</a:t>
             </a:fld>
             <a:endParaRPr lang="en-US"/>
           </a:p>
@@ -2528,7 +2528,7 @@
           <a:p>
             <a:fld id="{0E7CC0F2-DA42-B046-B261-A309B05013EA}" type="datetimeFigureOut">
               <a:rPr lang="en-US" smtClean="0"/>
-              <a:t>11/14/17</a:t>
+              <a:t>11/16/17</a:t>
             </a:fld>
             <a:endParaRPr lang="en-US"/>
           </a:p>
@@ -2741,7 +2741,7 @@
           <a:p>
             <a:fld id="{0E7CC0F2-DA42-B046-B261-A309B05013EA}" type="datetimeFigureOut">
               <a:rPr lang="en-US" smtClean="0"/>
-              <a:t>11/14/17</a:t>
+              <a:t>11/16/17</a:t>
             </a:fld>
             <a:endParaRPr lang="en-US"/>
           </a:p>
@@ -3441,13 +3441,6 @@
               </a:rPr>
               <a:t>Using MATLAB with SoS Notebook</a:t>
             </a:r>
-            <a:endParaRPr lang="en-US" sz="4400" dirty="0" smtClean="0">
-              <a:solidFill>
-                <a:schemeClr val="accent1"/>
-              </a:solidFill>
-              <a:latin typeface="Source Sans Pro Light"/>
-              <a:cs typeface="Source Sans Pro Light"/>
-            </a:endParaRPr>
           </a:p>
           <a:p>
             <a:pPr algn="l">
@@ -3502,13 +3495,6 @@
               </a:rPr>
               <a:t>Requires:</a:t>
             </a:r>
-            <a:endParaRPr lang="en-US" sz="1600" dirty="0" smtClean="0">
-              <a:solidFill>
-                <a:schemeClr val="accent1"/>
-              </a:solidFill>
-              <a:latin typeface="Source Sans Pro Light"/>
-              <a:cs typeface="Source Sans Pro Light"/>
-            </a:endParaRPr>
           </a:p>
           <a:p>
             <a:pPr algn="l">
@@ -3524,7 +3510,84 @@
                 <a:latin typeface="Source Sans Pro Light"/>
                 <a:cs typeface="Source Sans Pro Light"/>
               </a:rPr>
-              <a:t>	Python 3.6+,  MATLAB 2017b+, sos, sos-notebook, sos-</a:t>
+              <a:t>	Python 3.6+,  MATLAB 2017b+, </a:t>
+            </a:r>
+            <a:r>
+              <a:rPr lang="en-US" sz="1400" dirty="0" err="1" smtClean="0">
+                <a:solidFill>
+                  <a:schemeClr val="accent1"/>
+                </a:solidFill>
+                <a:latin typeface="Source Sans Pro Light"/>
+                <a:cs typeface="Source Sans Pro Light"/>
+              </a:rPr>
+              <a:t>imatlab</a:t>
+            </a:r>
+            <a:r>
+              <a:rPr lang="en-US" sz="1400" dirty="0" smtClean="0">
+                <a:solidFill>
+                  <a:schemeClr val="accent1"/>
+                </a:solidFill>
+                <a:latin typeface="Source Sans Pro Light"/>
+                <a:cs typeface="Source Sans Pro Light"/>
+              </a:rPr>
+              <a:t>, sos</a:t>
+            </a:r>
+            <a:r>
+              <a:rPr lang="en-US" sz="1400" dirty="0" smtClean="0">
+                <a:solidFill>
+                  <a:schemeClr val="accent1"/>
+                </a:solidFill>
+                <a:latin typeface="Source Sans Pro Light"/>
+                <a:cs typeface="Source Sans Pro Light"/>
+              </a:rPr>
+              <a:t>, sos-notebook</a:t>
+            </a:r>
+            <a:r>
+              <a:rPr lang="en-US" sz="1400" dirty="0" smtClean="0">
+                <a:solidFill>
+                  <a:schemeClr val="accent1"/>
+                </a:solidFill>
+                <a:latin typeface="Source Sans Pro Light"/>
+                <a:cs typeface="Source Sans Pro Light"/>
+              </a:rPr>
+              <a:t>, </a:t>
+            </a:r>
+          </a:p>
+          <a:p>
+            <a:pPr algn="l">
+              <a:spcBef>
+                <a:spcPts val="900"/>
+              </a:spcBef>
+            </a:pPr>
+            <a:r>
+              <a:rPr lang="en-US" sz="1400">
+                <a:solidFill>
+                  <a:schemeClr val="accent1"/>
+                </a:solidFill>
+                <a:latin typeface="Source Sans Pro Light"/>
+                <a:cs typeface="Source Sans Pro Light"/>
+              </a:rPr>
+              <a:t>	</a:t>
+            </a:r>
+            <a:r>
+              <a:rPr lang="en-US" sz="1400" smtClean="0">
+                <a:solidFill>
+                  <a:schemeClr val="accent1"/>
+                </a:solidFill>
+                <a:latin typeface="Source Sans Pro Light"/>
+                <a:cs typeface="Source Sans Pro Light"/>
+              </a:rPr>
+              <a:t>and </a:t>
+            </a:r>
+            <a:r>
+              <a:rPr lang="en-US" sz="1400" smtClean="0">
+                <a:solidFill>
+                  <a:schemeClr val="accent1"/>
+                </a:solidFill>
+                <a:latin typeface="Source Sans Pro Light"/>
+                <a:cs typeface="Source Sans Pro Light"/>
+              </a:rPr>
+              <a:t>sos-</a:t>
             </a:r>
             <a:r>
               <a:rPr lang="en-US" sz="1400" dirty="0" err="1" smtClean="0">

</xml_diff>